<commit_message>
Update Driver Drowsiness Detection_presentation.pptx
</commit_message>
<xml_diff>
--- a/Driver Drowsiness Detection_presentation.pptx
+++ b/Driver Drowsiness Detection_presentation.pptx
@@ -11660,7 +11660,14 @@
             <a:pPr algn="ctr"/>
             <a:r>
               <a:rPr lang="en-US" sz="2800" dirty="0"/>
-              <a:t>It prevents accidents caused by inattention due to driver fatigue!</a:t>
+              <a:t>Driver Drowsiness Detection</a:t>
+            </a:r>
+          </a:p>
+          <a:p>
+            <a:pPr algn="ctr"/>
+            <a:r>
+              <a:rPr lang="en-US" sz="2800" dirty="0"/>
+              <a:t>prevents accidents caused by inattention due to driver fatigue!</a:t>
             </a:r>
             <a:endParaRPr lang="de-DE" sz="2800" dirty="0"/>
           </a:p>

</xml_diff>